<commit_message>
kurulum ve uygulama dokümanları güncellendi
</commit_message>
<xml_diff>
--- a/04-Buyuk-Veri-Sorgulama/01_apache_hive_teori.pptx
+++ b/04-Buyuk-Veri-Sorgulama/01_apache_hive_teori.pptx
@@ -333,6 +333,90 @@
       </pc:sldChg>
     </pc:docChg>
   </pc:docChgLst>
+  <pc:docChgLst>
+    <pc:chgData name="Erkan ŞİRİN" userId="7f10ce1d6aaf8c5d" providerId="LiveId" clId="{77AFF1D1-5CCF-4CA4-8BC6-B75713393725}"/>
+    <pc:docChg chg="custSel modSld">
+      <pc:chgData name="Erkan ŞİRİN" userId="7f10ce1d6aaf8c5d" providerId="LiveId" clId="{77AFF1D1-5CCF-4CA4-8BC6-B75713393725}" dt="2019-07-23T04:52:24.720" v="4" actId="478"/>
+      <pc:docMkLst>
+        <pc:docMk/>
+      </pc:docMkLst>
+      <pc:sldChg chg="delSp">
+        <pc:chgData name="Erkan ŞİRİN" userId="7f10ce1d6aaf8c5d" providerId="LiveId" clId="{77AFF1D1-5CCF-4CA4-8BC6-B75713393725}" dt="2019-07-23T04:51:59.803" v="0" actId="478"/>
+        <pc:sldMkLst>
+          <pc:docMk/>
+          <pc:sldMk cId="1416118015" sldId="257"/>
+        </pc:sldMkLst>
+        <pc:picChg chg="del">
+          <ac:chgData name="Erkan ŞİRİN" userId="7f10ce1d6aaf8c5d" providerId="LiveId" clId="{77AFF1D1-5CCF-4CA4-8BC6-B75713393725}" dt="2019-07-23T04:51:59.803" v="0" actId="478"/>
+          <ac:picMkLst>
+            <pc:docMk/>
+            <pc:sldMk cId="1416118015" sldId="257"/>
+            <ac:picMk id="17" creationId="{7A19E1F5-7521-4BE3-BAED-121D8779385B}"/>
+          </ac:picMkLst>
+        </pc:picChg>
+      </pc:sldChg>
+      <pc:sldChg chg="delSp">
+        <pc:chgData name="Erkan ŞİRİN" userId="7f10ce1d6aaf8c5d" providerId="LiveId" clId="{77AFF1D1-5CCF-4CA4-8BC6-B75713393725}" dt="2019-07-23T04:52:03.568" v="1" actId="478"/>
+        <pc:sldMkLst>
+          <pc:docMk/>
+          <pc:sldMk cId="2813886073" sldId="258"/>
+        </pc:sldMkLst>
+        <pc:picChg chg="del">
+          <ac:chgData name="Erkan ŞİRİN" userId="7f10ce1d6aaf8c5d" providerId="LiveId" clId="{77AFF1D1-5CCF-4CA4-8BC6-B75713393725}" dt="2019-07-23T04:52:03.568" v="1" actId="478"/>
+          <ac:picMkLst>
+            <pc:docMk/>
+            <pc:sldMk cId="2813886073" sldId="258"/>
+            <ac:picMk id="18" creationId="{68ABD26A-2A76-4FED-8870-31010D1B6118}"/>
+          </ac:picMkLst>
+        </pc:picChg>
+      </pc:sldChg>
+      <pc:sldChg chg="delSp">
+        <pc:chgData name="Erkan ŞİRİN" userId="7f10ce1d6aaf8c5d" providerId="LiveId" clId="{77AFF1D1-5CCF-4CA4-8BC6-B75713393725}" dt="2019-07-23T04:52:07.864" v="2" actId="478"/>
+        <pc:sldMkLst>
+          <pc:docMk/>
+          <pc:sldMk cId="2227709425" sldId="259"/>
+        </pc:sldMkLst>
+        <pc:picChg chg="del">
+          <ac:chgData name="Erkan ŞİRİN" userId="7f10ce1d6aaf8c5d" providerId="LiveId" clId="{77AFF1D1-5CCF-4CA4-8BC6-B75713393725}" dt="2019-07-23T04:52:07.864" v="2" actId="478"/>
+          <ac:picMkLst>
+            <pc:docMk/>
+            <pc:sldMk cId="2227709425" sldId="259"/>
+            <ac:picMk id="18" creationId="{956A8522-D338-4FFD-AF27-E56A2AD8160F}"/>
+          </ac:picMkLst>
+        </pc:picChg>
+      </pc:sldChg>
+      <pc:sldChg chg="delSp">
+        <pc:chgData name="Erkan ŞİRİN" userId="7f10ce1d6aaf8c5d" providerId="LiveId" clId="{77AFF1D1-5CCF-4CA4-8BC6-B75713393725}" dt="2019-07-23T04:52:18.565" v="3" actId="478"/>
+        <pc:sldMkLst>
+          <pc:docMk/>
+          <pc:sldMk cId="3308122537" sldId="262"/>
+        </pc:sldMkLst>
+        <pc:picChg chg="del">
+          <ac:chgData name="Erkan ŞİRİN" userId="7f10ce1d6aaf8c5d" providerId="LiveId" clId="{77AFF1D1-5CCF-4CA4-8BC6-B75713393725}" dt="2019-07-23T04:52:18.565" v="3" actId="478"/>
+          <ac:picMkLst>
+            <pc:docMk/>
+            <pc:sldMk cId="3308122537" sldId="262"/>
+            <ac:picMk id="17" creationId="{C79F05D6-5250-4414-8845-323687DD306E}"/>
+          </ac:picMkLst>
+        </pc:picChg>
+      </pc:sldChg>
+      <pc:sldChg chg="delSp">
+        <pc:chgData name="Erkan ŞİRİN" userId="7f10ce1d6aaf8c5d" providerId="LiveId" clId="{77AFF1D1-5CCF-4CA4-8BC6-B75713393725}" dt="2019-07-23T04:52:24.720" v="4" actId="478"/>
+        <pc:sldMkLst>
+          <pc:docMk/>
+          <pc:sldMk cId="674586216" sldId="263"/>
+        </pc:sldMkLst>
+        <pc:picChg chg="del">
+          <ac:chgData name="Erkan ŞİRİN" userId="7f10ce1d6aaf8c5d" providerId="LiveId" clId="{77AFF1D1-5CCF-4CA4-8BC6-B75713393725}" dt="2019-07-23T04:52:24.720" v="4" actId="478"/>
+          <ac:picMkLst>
+            <pc:docMk/>
+            <pc:sldMk cId="674586216" sldId="263"/>
+            <ac:picMk id="20" creationId="{AA95B2E0-7F87-4A87-B87E-797B1A39B94F}"/>
+          </ac:picMkLst>
+        </pc:picChg>
+      </pc:sldChg>
+    </pc:docChg>
+  </pc:docChgLst>
 </pc:chgInfo>
 </file>
 
@@ -418,7 +502,7 @@
           <a:p>
             <a:fld id="{6F77F576-AE14-466D-AA6B-335273622B21}" type="datetimeFigureOut">
               <a:rPr lang="en-US" smtClean="0"/>
-              <a:t>5/6/2019</a:t>
+              <a:t>7/23/2019</a:t>
             </a:fld>
             <a:endParaRPr lang="en-US"/>
           </a:p>
@@ -817,7 +901,7 @@
           <a:p>
             <a:fld id="{54AA066D-271F-4C1A-B89A-0705A7689EE9}" type="datetimeFigureOut">
               <a:rPr lang="en-US" smtClean="0"/>
-              <a:t>5/6/2019</a:t>
+              <a:t>7/23/2019</a:t>
             </a:fld>
             <a:endParaRPr lang="en-US"/>
           </a:p>
@@ -987,7 +1071,7 @@
           <a:p>
             <a:fld id="{54AA066D-271F-4C1A-B89A-0705A7689EE9}" type="datetimeFigureOut">
               <a:rPr lang="en-US" smtClean="0"/>
-              <a:t>5/6/2019</a:t>
+              <a:t>7/23/2019</a:t>
             </a:fld>
             <a:endParaRPr lang="en-US"/>
           </a:p>
@@ -1167,7 +1251,7 @@
           <a:p>
             <a:fld id="{54AA066D-271F-4C1A-B89A-0705A7689EE9}" type="datetimeFigureOut">
               <a:rPr lang="en-US" smtClean="0"/>
-              <a:t>5/6/2019</a:t>
+              <a:t>7/23/2019</a:t>
             </a:fld>
             <a:endParaRPr lang="en-US"/>
           </a:p>
@@ -1337,7 +1421,7 @@
           <a:p>
             <a:fld id="{54AA066D-271F-4C1A-B89A-0705A7689EE9}" type="datetimeFigureOut">
               <a:rPr lang="en-US" smtClean="0"/>
-              <a:t>5/6/2019</a:t>
+              <a:t>7/23/2019</a:t>
             </a:fld>
             <a:endParaRPr lang="en-US"/>
           </a:p>
@@ -1583,7 +1667,7 @@
           <a:p>
             <a:fld id="{54AA066D-271F-4C1A-B89A-0705A7689EE9}" type="datetimeFigureOut">
               <a:rPr lang="en-US" smtClean="0"/>
-              <a:t>5/6/2019</a:t>
+              <a:t>7/23/2019</a:t>
             </a:fld>
             <a:endParaRPr lang="en-US"/>
           </a:p>
@@ -1815,7 +1899,7 @@
           <a:p>
             <a:fld id="{54AA066D-271F-4C1A-B89A-0705A7689EE9}" type="datetimeFigureOut">
               <a:rPr lang="en-US" smtClean="0"/>
-              <a:t>5/6/2019</a:t>
+              <a:t>7/23/2019</a:t>
             </a:fld>
             <a:endParaRPr lang="en-US"/>
           </a:p>
@@ -2182,7 +2266,7 @@
           <a:p>
             <a:fld id="{54AA066D-271F-4C1A-B89A-0705A7689EE9}" type="datetimeFigureOut">
               <a:rPr lang="en-US" smtClean="0"/>
-              <a:t>5/6/2019</a:t>
+              <a:t>7/23/2019</a:t>
             </a:fld>
             <a:endParaRPr lang="en-US"/>
           </a:p>
@@ -2300,7 +2384,7 @@
           <a:p>
             <a:fld id="{54AA066D-271F-4C1A-B89A-0705A7689EE9}" type="datetimeFigureOut">
               <a:rPr lang="en-US" smtClean="0"/>
-              <a:t>5/6/2019</a:t>
+              <a:t>7/23/2019</a:t>
             </a:fld>
             <a:endParaRPr lang="en-US"/>
           </a:p>
@@ -2395,7 +2479,7 @@
           <a:p>
             <a:fld id="{54AA066D-271F-4C1A-B89A-0705A7689EE9}" type="datetimeFigureOut">
               <a:rPr lang="en-US" smtClean="0"/>
-              <a:t>5/6/2019</a:t>
+              <a:t>7/23/2019</a:t>
             </a:fld>
             <a:endParaRPr lang="en-US"/>
           </a:p>
@@ -2672,7 +2756,7 @@
           <a:p>
             <a:fld id="{54AA066D-271F-4C1A-B89A-0705A7689EE9}" type="datetimeFigureOut">
               <a:rPr lang="en-US" smtClean="0"/>
-              <a:t>5/6/2019</a:t>
+              <a:t>7/23/2019</a:t>
             </a:fld>
             <a:endParaRPr lang="en-US"/>
           </a:p>
@@ -2925,7 +3009,7 @@
           <a:p>
             <a:fld id="{54AA066D-271F-4C1A-B89A-0705A7689EE9}" type="datetimeFigureOut">
               <a:rPr lang="en-US" smtClean="0"/>
-              <a:t>5/6/2019</a:t>
+              <a:t>7/23/2019</a:t>
             </a:fld>
             <a:endParaRPr lang="en-US"/>
           </a:p>
@@ -3138,7 +3222,7 @@
           <a:p>
             <a:fld id="{54AA066D-271F-4C1A-B89A-0705A7689EE9}" type="datetimeFigureOut">
               <a:rPr lang="en-US" smtClean="0"/>
-              <a:t>5/6/2019</a:t>
+              <a:t>7/23/2019</a:t>
             </a:fld>
             <a:endParaRPr lang="en-US"/>
           </a:p>
@@ -3676,42 +3760,6 @@
           </a:prstGeom>
         </p:spPr>
       </p:pic>
-      <p:pic>
-        <p:nvPicPr>
-          <p:cNvPr id="17" name="Resim 16">
-            <a:extLst>
-              <a:ext uri="{FF2B5EF4-FFF2-40B4-BE49-F238E27FC236}">
-                <a16:creationId xmlns:a16="http://schemas.microsoft.com/office/drawing/2014/main" id="{7A19E1F5-7521-4BE3-BAED-121D8779385B}"/>
-              </a:ext>
-            </a:extLst>
-          </p:cNvPr>
-          <p:cNvPicPr>
-            <a:picLocks noChangeAspect="1"/>
-          </p:cNvPicPr>
-          <p:nvPr/>
-        </p:nvPicPr>
-        <p:blipFill>
-          <a:blip r:embed="rId3">
-            <a:extLst>
-              <a:ext uri="{28A0092B-C50C-407E-A947-70E740481C1C}">
-                <a14:useLocalDpi xmlns:a14="http://schemas.microsoft.com/office/drawing/2010/main" val="0"/>
-              </a:ext>
-            </a:extLst>
-          </a:blip>
-          <a:stretch>
-            <a:fillRect/>
-          </a:stretch>
-        </p:blipFill>
-        <p:spPr>
-          <a:xfrm>
-            <a:off x="340622" y="6362072"/>
-            <a:ext cx="2154700" cy="308365"/>
-          </a:xfrm>
-          <a:prstGeom prst="rect">
-            <a:avLst/>
-          </a:prstGeom>
-        </p:spPr>
-      </p:pic>
     </p:spTree>
     <p:extLst>
       <p:ext uri="{BB962C8B-B14F-4D97-AF65-F5344CB8AC3E}">
@@ -5129,42 +5177,6 @@
           </a:p>
         </p:txBody>
       </p:sp>
-      <p:pic>
-        <p:nvPicPr>
-          <p:cNvPr id="18" name="Resim 17">
-            <a:extLst>
-              <a:ext uri="{FF2B5EF4-FFF2-40B4-BE49-F238E27FC236}">
-                <a16:creationId xmlns:a16="http://schemas.microsoft.com/office/drawing/2014/main" id="{68ABD26A-2A76-4FED-8870-31010D1B6118}"/>
-              </a:ext>
-            </a:extLst>
-          </p:cNvPr>
-          <p:cNvPicPr>
-            <a:picLocks noChangeAspect="1"/>
-          </p:cNvPicPr>
-          <p:nvPr/>
-        </p:nvPicPr>
-        <p:blipFill>
-          <a:blip r:embed="rId2">
-            <a:extLst>
-              <a:ext uri="{28A0092B-C50C-407E-A947-70E740481C1C}">
-                <a14:useLocalDpi xmlns:a14="http://schemas.microsoft.com/office/drawing/2010/main" val="0"/>
-              </a:ext>
-            </a:extLst>
-          </a:blip>
-          <a:stretch>
-            <a:fillRect/>
-          </a:stretch>
-        </p:blipFill>
-        <p:spPr>
-          <a:xfrm>
-            <a:off x="340622" y="6362072"/>
-            <a:ext cx="2154700" cy="308365"/>
-          </a:xfrm>
-          <a:prstGeom prst="rect">
-            <a:avLst/>
-          </a:prstGeom>
-        </p:spPr>
-      </p:pic>
     </p:spTree>
     <p:extLst>
       <p:ext uri="{BB962C8B-B14F-4D97-AF65-F5344CB8AC3E}">
@@ -5446,42 +5458,6 @@
           </a:p>
         </p:txBody>
       </p:sp>
-      <p:pic>
-        <p:nvPicPr>
-          <p:cNvPr id="18" name="Resim 17">
-            <a:extLst>
-              <a:ext uri="{FF2B5EF4-FFF2-40B4-BE49-F238E27FC236}">
-                <a16:creationId xmlns:a16="http://schemas.microsoft.com/office/drawing/2014/main" id="{956A8522-D338-4FFD-AF27-E56A2AD8160F}"/>
-              </a:ext>
-            </a:extLst>
-          </p:cNvPr>
-          <p:cNvPicPr>
-            <a:picLocks noChangeAspect="1"/>
-          </p:cNvPicPr>
-          <p:nvPr/>
-        </p:nvPicPr>
-        <p:blipFill>
-          <a:blip r:embed="rId3">
-            <a:extLst>
-              <a:ext uri="{28A0092B-C50C-407E-A947-70E740481C1C}">
-                <a14:useLocalDpi xmlns:a14="http://schemas.microsoft.com/office/drawing/2010/main" val="0"/>
-              </a:ext>
-            </a:extLst>
-          </a:blip>
-          <a:stretch>
-            <a:fillRect/>
-          </a:stretch>
-        </p:blipFill>
-        <p:spPr>
-          <a:xfrm>
-            <a:off x="340622" y="6362072"/>
-            <a:ext cx="2154700" cy="308365"/>
-          </a:xfrm>
-          <a:prstGeom prst="rect">
-            <a:avLst/>
-          </a:prstGeom>
-        </p:spPr>
-      </p:pic>
     </p:spTree>
     <p:extLst>
       <p:ext uri="{BB962C8B-B14F-4D97-AF65-F5344CB8AC3E}">
@@ -7071,42 +7047,6 @@
           </a:p>
         </p:txBody>
       </p:sp>
-      <p:pic>
-        <p:nvPicPr>
-          <p:cNvPr id="17" name="Resim 16">
-            <a:extLst>
-              <a:ext uri="{FF2B5EF4-FFF2-40B4-BE49-F238E27FC236}">
-                <a16:creationId xmlns:a16="http://schemas.microsoft.com/office/drawing/2014/main" id="{C79F05D6-5250-4414-8845-323687DD306E}"/>
-              </a:ext>
-            </a:extLst>
-          </p:cNvPr>
-          <p:cNvPicPr>
-            <a:picLocks noChangeAspect="1"/>
-          </p:cNvPicPr>
-          <p:nvPr/>
-        </p:nvPicPr>
-        <p:blipFill>
-          <a:blip r:embed="rId2">
-            <a:extLst>
-              <a:ext uri="{28A0092B-C50C-407E-A947-70E740481C1C}">
-                <a14:useLocalDpi xmlns:a14="http://schemas.microsoft.com/office/drawing/2010/main" val="0"/>
-              </a:ext>
-            </a:extLst>
-          </a:blip>
-          <a:stretch>
-            <a:fillRect/>
-          </a:stretch>
-        </p:blipFill>
-        <p:spPr>
-          <a:xfrm>
-            <a:off x="340622" y="6362072"/>
-            <a:ext cx="2154700" cy="308365"/>
-          </a:xfrm>
-          <a:prstGeom prst="rect">
-            <a:avLst/>
-          </a:prstGeom>
-        </p:spPr>
-      </p:pic>
     </p:spTree>
     <p:extLst>
       <p:ext uri="{BB962C8B-B14F-4D97-AF65-F5344CB8AC3E}">
@@ -7418,42 +7358,6 @@
           <a:xfrm>
             <a:off x="7776029" y="3426098"/>
             <a:ext cx="3200400" cy="1790700"/>
-          </a:xfrm>
-          <a:prstGeom prst="rect">
-            <a:avLst/>
-          </a:prstGeom>
-        </p:spPr>
-      </p:pic>
-      <p:pic>
-        <p:nvPicPr>
-          <p:cNvPr id="20" name="Resim 19">
-            <a:extLst>
-              <a:ext uri="{FF2B5EF4-FFF2-40B4-BE49-F238E27FC236}">
-                <a16:creationId xmlns:a16="http://schemas.microsoft.com/office/drawing/2014/main" id="{AA95B2E0-7F87-4A87-B87E-797B1A39B94F}"/>
-              </a:ext>
-            </a:extLst>
-          </p:cNvPr>
-          <p:cNvPicPr>
-            <a:picLocks noChangeAspect="1"/>
-          </p:cNvPicPr>
-          <p:nvPr/>
-        </p:nvPicPr>
-        <p:blipFill>
-          <a:blip r:embed="rId5">
-            <a:extLst>
-              <a:ext uri="{28A0092B-C50C-407E-A947-70E740481C1C}">
-                <a14:useLocalDpi xmlns:a14="http://schemas.microsoft.com/office/drawing/2010/main" val="0"/>
-              </a:ext>
-            </a:extLst>
-          </a:blip>
-          <a:stretch>
-            <a:fillRect/>
-          </a:stretch>
-        </p:blipFill>
-        <p:spPr>
-          <a:xfrm>
-            <a:off x="340622" y="6362072"/>
-            <a:ext cx="2154700" cy="308365"/>
           </a:xfrm>
           <a:prstGeom prst="rect">
             <a:avLst/>

</xml_diff>